<commit_message>
rename Examples Applications to Example Applications
</commit_message>
<xml_diff>
--- a/ApplicationDeveloperGuide/images/networking_overview.pptx
+++ b/ApplicationDeveloperGuide/images/networking_overview.pptx
@@ -6257,7 +6257,7 @@
           <p:cNvPr id="14" name="Slide Number Placeholder 5">
             <a:extLst>
               <a:ext uri="{FF2B5EF4-FFF2-40B4-BE49-F238E27FC236}">
-                <a16:creationId xmlns:a16="http://schemas.microsoft.com/office/drawing/2014/main" xmlns="" id="{D6A5EA0A-9DA9-564F-8F7D-CF263DB84C39}"/>
+                <a16:creationId xmlns="" xmlns:a16="http://schemas.microsoft.com/office/drawing/2014/main" id="{D6A5EA0A-9DA9-564F-8F7D-CF263DB84C39}"/>
               </a:ext>
             </a:extLst>
           </p:cNvPr>
@@ -6425,7 +6425,7 @@
           <p:cNvPr id="21" name="Straight Connector 20">
             <a:extLst>
               <a:ext uri="{FF2B5EF4-FFF2-40B4-BE49-F238E27FC236}">
-                <a16:creationId xmlns:a16="http://schemas.microsoft.com/office/drawing/2014/main" xmlns="" id="{F4443C96-B82D-F449-A71B-02134B6BB207}"/>
+                <a16:creationId xmlns="" xmlns:a16="http://schemas.microsoft.com/office/drawing/2014/main" id="{F4443C96-B82D-F449-A71B-02134B6BB207}"/>
               </a:ext>
             </a:extLst>
           </p:cNvPr>
@@ -6936,7 +6936,7 @@
           <p:cNvPr id="2" name="Straight Connector 1">
             <a:extLst>
               <a:ext uri="{FF2B5EF4-FFF2-40B4-BE49-F238E27FC236}">
-                <a16:creationId xmlns:a16="http://schemas.microsoft.com/office/drawing/2014/main" xmlns="" id="{69468F00-CD4C-A248-A4B1-C7B7588C2D3D}"/>
+                <a16:creationId xmlns="" xmlns:a16="http://schemas.microsoft.com/office/drawing/2014/main" id="{69468F00-CD4C-A248-A4B1-C7B7588C2D3D}"/>
               </a:ext>
             </a:extLst>
           </p:cNvPr>
@@ -6977,7 +6977,7 @@
           <p:cNvPr id="3" name="TextBox 2">
             <a:extLst>
               <a:ext uri="{FF2B5EF4-FFF2-40B4-BE49-F238E27FC236}">
-                <a16:creationId xmlns:a16="http://schemas.microsoft.com/office/drawing/2014/main" xmlns="" id="{48FC3BF8-BB80-DF47-B91F-CB24163470D3}"/>
+                <a16:creationId xmlns="" xmlns:a16="http://schemas.microsoft.com/office/drawing/2014/main" id="{48FC3BF8-BB80-DF47-B91F-CB24163470D3}"/>
               </a:ext>
             </a:extLst>
           </p:cNvPr>
@@ -7029,7 +7029,7 @@
           <p:cNvPr id="4" name="Rounded Rectangle 3">
             <a:extLst>
               <a:ext uri="{FF2B5EF4-FFF2-40B4-BE49-F238E27FC236}">
-                <a16:creationId xmlns:a16="http://schemas.microsoft.com/office/drawing/2014/main" xmlns="" id="{56D03FB4-14D4-9F48-A061-0B8E91CCC141}"/>
+                <a16:creationId xmlns="" xmlns:a16="http://schemas.microsoft.com/office/drawing/2014/main" id="{56D03FB4-14D4-9F48-A061-0B8E91CCC141}"/>
               </a:ext>
             </a:extLst>
           </p:cNvPr>
@@ -7091,7 +7091,7 @@
           <p:cNvPr id="5" name="Arc 4">
             <a:extLst>
               <a:ext uri="{FF2B5EF4-FFF2-40B4-BE49-F238E27FC236}">
-                <a16:creationId xmlns:a16="http://schemas.microsoft.com/office/drawing/2014/main" xmlns="" id="{CDA75251-2717-3E43-BB3A-DBBEB462FB90}"/>
+                <a16:creationId xmlns="" xmlns:a16="http://schemas.microsoft.com/office/drawing/2014/main" id="{CDA75251-2717-3E43-BB3A-DBBEB462FB90}"/>
               </a:ext>
             </a:extLst>
           </p:cNvPr>
@@ -7145,7 +7145,7 @@
           <p:cNvPr id="6" name="Arc 5">
             <a:extLst>
               <a:ext uri="{FF2B5EF4-FFF2-40B4-BE49-F238E27FC236}">
-                <a16:creationId xmlns:a16="http://schemas.microsoft.com/office/drawing/2014/main" xmlns="" id="{03DA70D7-2CF9-8747-BC92-DD0B286D3E0B}"/>
+                <a16:creationId xmlns="" xmlns:a16="http://schemas.microsoft.com/office/drawing/2014/main" id="{03DA70D7-2CF9-8747-BC92-DD0B286D3E0B}"/>
               </a:ext>
             </a:extLst>
           </p:cNvPr>
@@ -7199,7 +7199,7 @@
           <p:cNvPr id="7" name="Snip Same Side Corner Rectangle 6">
             <a:extLst>
               <a:ext uri="{FF2B5EF4-FFF2-40B4-BE49-F238E27FC236}">
-                <a16:creationId xmlns:a16="http://schemas.microsoft.com/office/drawing/2014/main" xmlns="" id="{9CE42922-83A7-8B40-A4DE-A0EBB1D030D2}"/>
+                <a16:creationId xmlns="" xmlns:a16="http://schemas.microsoft.com/office/drawing/2014/main" id="{9CE42922-83A7-8B40-A4DE-A0EBB1D030D2}"/>
               </a:ext>
             </a:extLst>
           </p:cNvPr>
@@ -7269,7 +7269,7 @@
           <p:cNvPr id="8" name="Group 7">
             <a:extLst>
               <a:ext uri="{FF2B5EF4-FFF2-40B4-BE49-F238E27FC236}">
-                <a16:creationId xmlns:a16="http://schemas.microsoft.com/office/drawing/2014/main" xmlns="" id="{5248D8D9-D967-1348-A032-008E17139DEE}"/>
+                <a16:creationId xmlns="" xmlns:a16="http://schemas.microsoft.com/office/drawing/2014/main" id="{5248D8D9-D967-1348-A032-008E17139DEE}"/>
               </a:ext>
             </a:extLst>
           </p:cNvPr>
@@ -7289,7 +7289,7 @@
             <p:cNvPr id="9" name="Rounded Rectangle 370">
               <a:extLst>
                 <a:ext uri="{FF2B5EF4-FFF2-40B4-BE49-F238E27FC236}">
-                  <a16:creationId xmlns:a16="http://schemas.microsoft.com/office/drawing/2014/main" xmlns="" id="{2667F158-48EA-5048-8BCC-3E029C7677F6}"/>
+                  <a16:creationId xmlns="" xmlns:a16="http://schemas.microsoft.com/office/drawing/2014/main" id="{2667F158-48EA-5048-8BCC-3E029C7677F6}"/>
                 </a:ext>
               </a:extLst>
             </p:cNvPr>
@@ -8208,7 +8208,7 @@
             <p:cNvPr id="10" name="Group 9">
               <a:extLst>
                 <a:ext uri="{FF2B5EF4-FFF2-40B4-BE49-F238E27FC236}">
-                  <a16:creationId xmlns:a16="http://schemas.microsoft.com/office/drawing/2014/main" xmlns="" id="{5EC39D9C-6472-C04A-B9C6-3E3429006240}"/>
+                  <a16:creationId xmlns="" xmlns:a16="http://schemas.microsoft.com/office/drawing/2014/main" id="{5EC39D9C-6472-C04A-B9C6-3E3429006240}"/>
                 </a:ext>
               </a:extLst>
             </p:cNvPr>
@@ -8228,7 +8228,7 @@
               <p:cNvPr id="11" name="Rounded Rectangle 10">
                 <a:extLst>
                   <a:ext uri="{FF2B5EF4-FFF2-40B4-BE49-F238E27FC236}">
-                    <a16:creationId xmlns:a16="http://schemas.microsoft.com/office/drawing/2014/main" xmlns="" id="{37E1ADB6-BB23-6D4D-8040-4316BC097570}"/>
+                    <a16:creationId xmlns="" xmlns:a16="http://schemas.microsoft.com/office/drawing/2014/main" id="{37E1ADB6-BB23-6D4D-8040-4316BC097570}"/>
                   </a:ext>
                 </a:extLst>
               </p:cNvPr>
@@ -8291,7 +8291,7 @@
               <p:cNvPr id="12" name="Rectangle 11">
                 <a:extLst>
                   <a:ext uri="{FF2B5EF4-FFF2-40B4-BE49-F238E27FC236}">
-                    <a16:creationId xmlns:a16="http://schemas.microsoft.com/office/drawing/2014/main" xmlns="" id="{C2EBA6D6-1870-0A40-82C8-AE16E98BB260}"/>
+                    <a16:creationId xmlns="" xmlns:a16="http://schemas.microsoft.com/office/drawing/2014/main" id="{C2EBA6D6-1870-0A40-82C8-AE16E98BB260}"/>
                   </a:ext>
                 </a:extLst>
               </p:cNvPr>
@@ -8360,7 +8360,7 @@
               <p:cNvPr id="13" name="Picture 12">
                 <a:extLst>
                   <a:ext uri="{FF2B5EF4-FFF2-40B4-BE49-F238E27FC236}">
-                    <a16:creationId xmlns:a16="http://schemas.microsoft.com/office/drawing/2014/main" xmlns="" id="{4E01D07F-57C8-964A-BCB8-53AEEACFAE78}"/>
+                    <a16:creationId xmlns="" xmlns:a16="http://schemas.microsoft.com/office/drawing/2014/main" id="{4E01D07F-57C8-964A-BCB8-53AEEACFAE78}"/>
                   </a:ext>
                 </a:extLst>
               </p:cNvPr>
@@ -8399,7 +8399,7 @@
           <p:cNvPr id="14" name="Rounded Rectangle 13">
             <a:extLst>
               <a:ext uri="{FF2B5EF4-FFF2-40B4-BE49-F238E27FC236}">
-                <a16:creationId xmlns:a16="http://schemas.microsoft.com/office/drawing/2014/main" xmlns="" id="{B8F79B32-E337-A947-8A2C-8501B0E0D7EE}"/>
+                <a16:creationId xmlns="" xmlns:a16="http://schemas.microsoft.com/office/drawing/2014/main" id="{B8F79B32-E337-A947-8A2C-8501B0E0D7EE}"/>
               </a:ext>
             </a:extLst>
           </p:cNvPr>
@@ -8461,7 +8461,7 @@
           <p:cNvPr id="15" name="Rounded Rectangle 14">
             <a:extLst>
               <a:ext uri="{FF2B5EF4-FFF2-40B4-BE49-F238E27FC236}">
-                <a16:creationId xmlns:a16="http://schemas.microsoft.com/office/drawing/2014/main" xmlns="" id="{70F38BA2-FEE1-0B4D-AAE5-39A694AFBE0E}"/>
+                <a16:creationId xmlns="" xmlns:a16="http://schemas.microsoft.com/office/drawing/2014/main" id="{70F38BA2-FEE1-0B4D-AAE5-39A694AFBE0E}"/>
               </a:ext>
             </a:extLst>
           </p:cNvPr>
@@ -8532,7 +8532,7 @@
           <p:cNvPr id="16" name="Rounded Rectangle 15">
             <a:extLst>
               <a:ext uri="{FF2B5EF4-FFF2-40B4-BE49-F238E27FC236}">
-                <a16:creationId xmlns:a16="http://schemas.microsoft.com/office/drawing/2014/main" xmlns="" id="{94B69AB0-5C90-B24D-87C4-83F250AA65BB}"/>
+                <a16:creationId xmlns="" xmlns:a16="http://schemas.microsoft.com/office/drawing/2014/main" id="{94B69AB0-5C90-B24D-87C4-83F250AA65BB}"/>
               </a:ext>
             </a:extLst>
           </p:cNvPr>
@@ -8602,7 +8602,7 @@
           <p:cNvPr id="17" name="Group 16">
             <a:extLst>
               <a:ext uri="{FF2B5EF4-FFF2-40B4-BE49-F238E27FC236}">
-                <a16:creationId xmlns:a16="http://schemas.microsoft.com/office/drawing/2014/main" xmlns="" id="{526299CB-A110-C54D-BDF8-96E344AF1C1F}"/>
+                <a16:creationId xmlns="" xmlns:a16="http://schemas.microsoft.com/office/drawing/2014/main" id="{526299CB-A110-C54D-BDF8-96E344AF1C1F}"/>
               </a:ext>
             </a:extLst>
           </p:cNvPr>
@@ -8622,7 +8622,7 @@
             <p:cNvPr id="18" name="Rounded Rectangle 370">
               <a:extLst>
                 <a:ext uri="{FF2B5EF4-FFF2-40B4-BE49-F238E27FC236}">
-                  <a16:creationId xmlns:a16="http://schemas.microsoft.com/office/drawing/2014/main" xmlns="" id="{2E1FB874-03EC-C448-BFBA-8CD82A1D096B}"/>
+                  <a16:creationId xmlns="" xmlns:a16="http://schemas.microsoft.com/office/drawing/2014/main" id="{2E1FB874-03EC-C448-BFBA-8CD82A1D096B}"/>
                 </a:ext>
               </a:extLst>
             </p:cNvPr>
@@ -9613,7 +9613,7 @@
             <p:cNvPr id="19" name="Group 18">
               <a:extLst>
                 <a:ext uri="{FF2B5EF4-FFF2-40B4-BE49-F238E27FC236}">
-                  <a16:creationId xmlns:a16="http://schemas.microsoft.com/office/drawing/2014/main" xmlns="" id="{B274EFA6-9B42-5440-AF5B-359CF9E65901}"/>
+                  <a16:creationId xmlns="" xmlns:a16="http://schemas.microsoft.com/office/drawing/2014/main" id="{B274EFA6-9B42-5440-AF5B-359CF9E65901}"/>
                 </a:ext>
               </a:extLst>
             </p:cNvPr>
@@ -9633,7 +9633,7 @@
               <p:cNvPr id="20" name="Rounded Rectangle 19">
                 <a:extLst>
                   <a:ext uri="{FF2B5EF4-FFF2-40B4-BE49-F238E27FC236}">
-                    <a16:creationId xmlns:a16="http://schemas.microsoft.com/office/drawing/2014/main" xmlns="" id="{D046CDF5-B514-CA4E-8504-E436F806B938}"/>
+                    <a16:creationId xmlns="" xmlns:a16="http://schemas.microsoft.com/office/drawing/2014/main" id="{D046CDF5-B514-CA4E-8504-E436F806B938}"/>
                   </a:ext>
                 </a:extLst>
               </p:cNvPr>
@@ -9694,7 +9694,7 @@
               <p:cNvPr id="21" name="Group 20">
                 <a:extLst>
                   <a:ext uri="{FF2B5EF4-FFF2-40B4-BE49-F238E27FC236}">
-                    <a16:creationId xmlns:a16="http://schemas.microsoft.com/office/drawing/2014/main" xmlns="" id="{985BF61E-F2F3-0C4D-809B-EF1E436A8054}"/>
+                    <a16:creationId xmlns="" xmlns:a16="http://schemas.microsoft.com/office/drawing/2014/main" id="{985BF61E-F2F3-0C4D-809B-EF1E436A8054}"/>
                   </a:ext>
                 </a:extLst>
               </p:cNvPr>
@@ -9714,7 +9714,7 @@
                 <p:cNvPr id="22" name="Picture 21">
                   <a:extLst>
                     <a:ext uri="{FF2B5EF4-FFF2-40B4-BE49-F238E27FC236}">
-                      <a16:creationId xmlns:a16="http://schemas.microsoft.com/office/drawing/2014/main" xmlns="" id="{30A4E1B0-8052-744A-AA21-F5E88AF4F659}"/>
+                      <a16:creationId xmlns="" xmlns:a16="http://schemas.microsoft.com/office/drawing/2014/main" id="{30A4E1B0-8052-744A-AA21-F5E88AF4F659}"/>
                     </a:ext>
                   </a:extLst>
                 </p:cNvPr>
@@ -9750,7 +9750,7 @@
                 <p:cNvPr id="23" name="Picture 22">
                   <a:extLst>
                     <a:ext uri="{FF2B5EF4-FFF2-40B4-BE49-F238E27FC236}">
-                      <a16:creationId xmlns:a16="http://schemas.microsoft.com/office/drawing/2014/main" xmlns="" id="{9D8603F9-7AB8-BF43-94F5-7709429BE34B}"/>
+                      <a16:creationId xmlns="" xmlns:a16="http://schemas.microsoft.com/office/drawing/2014/main" id="{9D8603F9-7AB8-BF43-94F5-7709429BE34B}"/>
                     </a:ext>
                   </a:extLst>
                 </p:cNvPr>
@@ -9789,7 +9789,7 @@
           <p:cNvPr id="24" name="Rounded Rectangle 23">
             <a:extLst>
               <a:ext uri="{FF2B5EF4-FFF2-40B4-BE49-F238E27FC236}">
-                <a16:creationId xmlns:a16="http://schemas.microsoft.com/office/drawing/2014/main" xmlns="" id="{9BC58F33-9A79-7647-8348-AB37D1ED666F}"/>
+                <a16:creationId xmlns="" xmlns:a16="http://schemas.microsoft.com/office/drawing/2014/main" id="{9BC58F33-9A79-7647-8348-AB37D1ED666F}"/>
               </a:ext>
             </a:extLst>
           </p:cNvPr>
@@ -9867,7 +9867,7 @@
           <p:cNvPr id="25" name="Rounded Rectangle 24">
             <a:extLst>
               <a:ext uri="{FF2B5EF4-FFF2-40B4-BE49-F238E27FC236}">
-                <a16:creationId xmlns:a16="http://schemas.microsoft.com/office/drawing/2014/main" xmlns="" id="{4F103699-8CF4-F04E-9FD8-A2E530AA7A44}"/>
+                <a16:creationId xmlns="" xmlns:a16="http://schemas.microsoft.com/office/drawing/2014/main" id="{4F103699-8CF4-F04E-9FD8-A2E530AA7A44}"/>
               </a:ext>
             </a:extLst>
           </p:cNvPr>
@@ -9965,7 +9965,7 @@
           <p:cNvPr id="26" name="Rounded Rectangle 25">
             <a:extLst>
               <a:ext uri="{FF2B5EF4-FFF2-40B4-BE49-F238E27FC236}">
-                <a16:creationId xmlns:a16="http://schemas.microsoft.com/office/drawing/2014/main" xmlns="" id="{50E5510D-358F-9F42-A720-A6696D86B52E}"/>
+                <a16:creationId xmlns="" xmlns:a16="http://schemas.microsoft.com/office/drawing/2014/main" id="{50E5510D-358F-9F42-A720-A6696D86B52E}"/>
               </a:ext>
             </a:extLst>
           </p:cNvPr>
@@ -10052,7 +10052,7 @@
           <p:cNvPr id="27" name="Picture 26">
             <a:extLst>
               <a:ext uri="{FF2B5EF4-FFF2-40B4-BE49-F238E27FC236}">
-                <a16:creationId xmlns:a16="http://schemas.microsoft.com/office/drawing/2014/main" xmlns="" id="{FAB68817-1727-E14B-8341-25C675C96B88}"/>
+                <a16:creationId xmlns="" xmlns:a16="http://schemas.microsoft.com/office/drawing/2014/main" id="{FAB68817-1727-E14B-8341-25C675C96B88}"/>
               </a:ext>
             </a:extLst>
           </p:cNvPr>
@@ -10088,7 +10088,7 @@
           <p:cNvPr id="28" name="Rounded Rectangle 27">
             <a:extLst>
               <a:ext uri="{FF2B5EF4-FFF2-40B4-BE49-F238E27FC236}">
-                <a16:creationId xmlns:a16="http://schemas.microsoft.com/office/drawing/2014/main" xmlns="" id="{03CACB4B-51E8-0749-9340-40E24818686B}"/>
+                <a16:creationId xmlns="" xmlns:a16="http://schemas.microsoft.com/office/drawing/2014/main" id="{03CACB4B-51E8-0749-9340-40E24818686B}"/>
               </a:ext>
             </a:extLst>
           </p:cNvPr>
@@ -10154,7 +10154,7 @@
           <p:cNvPr id="29" name="Straight Connector 28">
             <a:extLst>
               <a:ext uri="{FF2B5EF4-FFF2-40B4-BE49-F238E27FC236}">
-                <a16:creationId xmlns:a16="http://schemas.microsoft.com/office/drawing/2014/main" xmlns="" id="{18FE8AAC-D28F-8C4B-92F4-8FFF81A0F0AF}"/>
+                <a16:creationId xmlns="" xmlns:a16="http://schemas.microsoft.com/office/drawing/2014/main" id="{18FE8AAC-D28F-8C4B-92F4-8FFF81A0F0AF}"/>
               </a:ext>
             </a:extLst>
           </p:cNvPr>
@@ -10198,7 +10198,7 @@
           <p:cNvPr id="30" name="Rectangle 29">
             <a:extLst>
               <a:ext uri="{FF2B5EF4-FFF2-40B4-BE49-F238E27FC236}">
-                <a16:creationId xmlns:a16="http://schemas.microsoft.com/office/drawing/2014/main" xmlns="" id="{12176BD1-BD30-A44F-9CAF-928FE6EBB79F}"/>
+                <a16:creationId xmlns="" xmlns:a16="http://schemas.microsoft.com/office/drawing/2014/main" id="{12176BD1-BD30-A44F-9CAF-928FE6EBB79F}"/>
               </a:ext>
             </a:extLst>
           </p:cNvPr>
@@ -10249,7 +10249,7 @@
           <p:cNvPr id="31" name="Rectangle 30">
             <a:extLst>
               <a:ext uri="{FF2B5EF4-FFF2-40B4-BE49-F238E27FC236}">
-                <a16:creationId xmlns:a16="http://schemas.microsoft.com/office/drawing/2014/main" xmlns="" id="{47E4C9E7-8973-4245-B612-41A03C8F1B0F}"/>
+                <a16:creationId xmlns="" xmlns:a16="http://schemas.microsoft.com/office/drawing/2014/main" id="{47E4C9E7-8973-4245-B612-41A03C8F1B0F}"/>
               </a:ext>
             </a:extLst>
           </p:cNvPr>
@@ -10301,7 +10301,7 @@
           <p:cNvPr id="32" name="Rectangle 31">
             <a:extLst>
               <a:ext uri="{FF2B5EF4-FFF2-40B4-BE49-F238E27FC236}">
-                <a16:creationId xmlns:a16="http://schemas.microsoft.com/office/drawing/2014/main" xmlns="" id="{6858A81E-4266-6F4F-8D93-B8419F4EE7F3}"/>
+                <a16:creationId xmlns="" xmlns:a16="http://schemas.microsoft.com/office/drawing/2014/main" id="{6858A81E-4266-6F4F-8D93-B8419F4EE7F3}"/>
               </a:ext>
             </a:extLst>
           </p:cNvPr>
@@ -10350,7 +10350,7 @@
           <p:cNvPr id="34" name="Rounded Rectangle 33">
             <a:extLst>
               <a:ext uri="{FF2B5EF4-FFF2-40B4-BE49-F238E27FC236}">
-                <a16:creationId xmlns:a16="http://schemas.microsoft.com/office/drawing/2014/main" xmlns="" id="{652FBA75-194F-3540-8133-BE6F3A0F58AF}"/>
+                <a16:creationId xmlns="" xmlns:a16="http://schemas.microsoft.com/office/drawing/2014/main" id="{652FBA75-194F-3540-8133-BE6F3A0F58AF}"/>
               </a:ext>
             </a:extLst>
           </p:cNvPr>
@@ -10415,7 +10415,7 @@
           <p:cNvPr id="35" name="Rounded Rectangle 34">
             <a:extLst>
               <a:ext uri="{FF2B5EF4-FFF2-40B4-BE49-F238E27FC236}">
-                <a16:creationId xmlns:a16="http://schemas.microsoft.com/office/drawing/2014/main" xmlns="" id="{8A925A23-0E65-C441-B5A9-B85B406C137A}"/>
+                <a16:creationId xmlns="" xmlns:a16="http://schemas.microsoft.com/office/drawing/2014/main" id="{8A925A23-0E65-C441-B5A9-B85B406C137A}"/>
               </a:ext>
             </a:extLst>
           </p:cNvPr>
@@ -10480,7 +10480,7 @@
           <p:cNvPr id="36" name="Rounded Rectangle 35">
             <a:extLst>
               <a:ext uri="{FF2B5EF4-FFF2-40B4-BE49-F238E27FC236}">
-                <a16:creationId xmlns:a16="http://schemas.microsoft.com/office/drawing/2014/main" xmlns="" id="{62B60516-5856-AF49-912D-EA309EAF0890}"/>
+                <a16:creationId xmlns="" xmlns:a16="http://schemas.microsoft.com/office/drawing/2014/main" id="{62B60516-5856-AF49-912D-EA309EAF0890}"/>
               </a:ext>
             </a:extLst>
           </p:cNvPr>
@@ -10545,7 +10545,7 @@
           <p:cNvPr id="37" name="Rounded Rectangle 36">
             <a:extLst>
               <a:ext uri="{FF2B5EF4-FFF2-40B4-BE49-F238E27FC236}">
-                <a16:creationId xmlns:a16="http://schemas.microsoft.com/office/drawing/2014/main" xmlns="" id="{E13C5F96-34C9-7E4C-AFA2-F1218F271DCD}"/>
+                <a16:creationId xmlns="" xmlns:a16="http://schemas.microsoft.com/office/drawing/2014/main" id="{E13C5F96-34C9-7E4C-AFA2-F1218F271DCD}"/>
               </a:ext>
             </a:extLst>
           </p:cNvPr>
@@ -10610,7 +10610,7 @@
           <p:cNvPr id="38" name="Rounded Rectangle 37">
             <a:extLst>
               <a:ext uri="{FF2B5EF4-FFF2-40B4-BE49-F238E27FC236}">
-                <a16:creationId xmlns:a16="http://schemas.microsoft.com/office/drawing/2014/main" xmlns="" id="{43368A84-1651-7944-B8C8-4E2FA7EA5146}"/>
+                <a16:creationId xmlns="" xmlns:a16="http://schemas.microsoft.com/office/drawing/2014/main" id="{43368A84-1651-7944-B8C8-4E2FA7EA5146}"/>
               </a:ext>
             </a:extLst>
           </p:cNvPr>
@@ -10683,7 +10683,7 @@
           <p:cNvPr id="39" name="Rounded Rectangle 38">
             <a:extLst>
               <a:ext uri="{FF2B5EF4-FFF2-40B4-BE49-F238E27FC236}">
-                <a16:creationId xmlns:a16="http://schemas.microsoft.com/office/drawing/2014/main" xmlns="" id="{E5171215-1FDA-2B4B-97DB-FC4AE8F1ED14}"/>
+                <a16:creationId xmlns="" xmlns:a16="http://schemas.microsoft.com/office/drawing/2014/main" id="{E5171215-1FDA-2B4B-97DB-FC4AE8F1ED14}"/>
               </a:ext>
             </a:extLst>
           </p:cNvPr>
@@ -10756,7 +10756,7 @@
           <p:cNvPr id="40" name="Rounded Rectangle 39">
             <a:extLst>
               <a:ext uri="{FF2B5EF4-FFF2-40B4-BE49-F238E27FC236}">
-                <a16:creationId xmlns:a16="http://schemas.microsoft.com/office/drawing/2014/main" xmlns="" id="{DB9583CE-8E47-B543-A3C6-0A7CECBE335C}"/>
+                <a16:creationId xmlns="" xmlns:a16="http://schemas.microsoft.com/office/drawing/2014/main" id="{DB9583CE-8E47-B543-A3C6-0A7CECBE335C}"/>
               </a:ext>
             </a:extLst>
           </p:cNvPr>
@@ -10829,7 +10829,7 @@
           <p:cNvPr id="41" name="Rectangle 40">
             <a:extLst>
               <a:ext uri="{FF2B5EF4-FFF2-40B4-BE49-F238E27FC236}">
-                <a16:creationId xmlns:a16="http://schemas.microsoft.com/office/drawing/2014/main" xmlns="" id="{60369472-40F5-0C49-8A0A-34721DA59A39}"/>
+                <a16:creationId xmlns="" xmlns:a16="http://schemas.microsoft.com/office/drawing/2014/main" id="{60369472-40F5-0C49-8A0A-34721DA59A39}"/>
               </a:ext>
             </a:extLst>
           </p:cNvPr>
@@ -10905,7 +10905,7 @@
           <p:cNvPr id="42" name="Rounded Rectangle 41">
             <a:extLst>
               <a:ext uri="{FF2B5EF4-FFF2-40B4-BE49-F238E27FC236}">
-                <a16:creationId xmlns:a16="http://schemas.microsoft.com/office/drawing/2014/main" xmlns="" id="{5E274B6F-5968-644B-A233-1D8C249F9D25}"/>
+                <a16:creationId xmlns="" xmlns:a16="http://schemas.microsoft.com/office/drawing/2014/main" id="{5E274B6F-5968-644B-A233-1D8C249F9D25}"/>
               </a:ext>
             </a:extLst>
           </p:cNvPr>
@@ -10972,7 +10972,7 @@
           <p:cNvPr id="43" name="Rounded Rectangle 42">
             <a:extLst>
               <a:ext uri="{FF2B5EF4-FFF2-40B4-BE49-F238E27FC236}">
-                <a16:creationId xmlns:a16="http://schemas.microsoft.com/office/drawing/2014/main" xmlns="" id="{614FB769-688F-494D-AE49-D1344E751FA6}"/>
+                <a16:creationId xmlns="" xmlns:a16="http://schemas.microsoft.com/office/drawing/2014/main" id="{614FB769-688F-494D-AE49-D1344E751FA6}"/>
               </a:ext>
             </a:extLst>
           </p:cNvPr>
@@ -11039,7 +11039,7 @@
           <p:cNvPr id="44" name="Rounded Rectangle 43">
             <a:extLst>
               <a:ext uri="{FF2B5EF4-FFF2-40B4-BE49-F238E27FC236}">
-                <a16:creationId xmlns:a16="http://schemas.microsoft.com/office/drawing/2014/main" xmlns="" id="{05350DC8-AB2D-7A48-95B6-111BD3F62D9E}"/>
+                <a16:creationId xmlns="" xmlns:a16="http://schemas.microsoft.com/office/drawing/2014/main" id="{05350DC8-AB2D-7A48-95B6-111BD3F62D9E}"/>
               </a:ext>
             </a:extLst>
           </p:cNvPr>
@@ -11106,7 +11106,7 @@
           <p:cNvPr id="45" name="Round Same Side Corner Rectangle 44">
             <a:extLst>
               <a:ext uri="{FF2B5EF4-FFF2-40B4-BE49-F238E27FC236}">
-                <a16:creationId xmlns:a16="http://schemas.microsoft.com/office/drawing/2014/main" xmlns="" id="{29077600-5340-3A45-9B91-0EB6485110C9}"/>
+                <a16:creationId xmlns="" xmlns:a16="http://schemas.microsoft.com/office/drawing/2014/main" id="{29077600-5340-3A45-9B91-0EB6485110C9}"/>
               </a:ext>
             </a:extLst>
           </p:cNvPr>
@@ -11165,7 +11165,7 @@
           <p:cNvPr id="46" name="Group 45">
             <a:extLst>
               <a:ext uri="{FF2B5EF4-FFF2-40B4-BE49-F238E27FC236}">
-                <a16:creationId xmlns:a16="http://schemas.microsoft.com/office/drawing/2014/main" xmlns="" id="{FD7C4469-4138-A54A-BE6C-A4230D2BC1FF}"/>
+                <a16:creationId xmlns="" xmlns:a16="http://schemas.microsoft.com/office/drawing/2014/main" id="{FD7C4469-4138-A54A-BE6C-A4230D2BC1FF}"/>
               </a:ext>
             </a:extLst>
           </p:cNvPr>
@@ -11185,7 +11185,7 @@
             <p:cNvPr id="47" name="Picture 46">
               <a:extLst>
                 <a:ext uri="{FF2B5EF4-FFF2-40B4-BE49-F238E27FC236}">
-                  <a16:creationId xmlns:a16="http://schemas.microsoft.com/office/drawing/2014/main" xmlns="" id="{71DCAA86-C435-1643-A64D-70F341619783}"/>
+                  <a16:creationId xmlns="" xmlns:a16="http://schemas.microsoft.com/office/drawing/2014/main" id="{71DCAA86-C435-1643-A64D-70F341619783}"/>
                 </a:ext>
               </a:extLst>
             </p:cNvPr>
@@ -11228,7 +11228,7 @@
             <p:cNvPr id="48" name="Rectangle 47">
               <a:extLst>
                 <a:ext uri="{FF2B5EF4-FFF2-40B4-BE49-F238E27FC236}">
-                  <a16:creationId xmlns:a16="http://schemas.microsoft.com/office/drawing/2014/main" xmlns="" id="{8B1DF283-C2C4-5743-B08E-3D0ED4C0383E}"/>
+                  <a16:creationId xmlns="" xmlns:a16="http://schemas.microsoft.com/office/drawing/2014/main" id="{8B1DF283-C2C4-5743-B08E-3D0ED4C0383E}"/>
                 </a:ext>
               </a:extLst>
             </p:cNvPr>
@@ -11284,7 +11284,7 @@
           <p:cNvPr id="49" name="Rectangle 48">
             <a:extLst>
               <a:ext uri="{FF2B5EF4-FFF2-40B4-BE49-F238E27FC236}">
-                <a16:creationId xmlns:a16="http://schemas.microsoft.com/office/drawing/2014/main" xmlns="" id="{BA88D557-8188-2941-A0CA-76EBC4BD4753}"/>
+                <a16:creationId xmlns="" xmlns:a16="http://schemas.microsoft.com/office/drawing/2014/main" id="{BA88D557-8188-2941-A0CA-76EBC4BD4753}"/>
               </a:ext>
             </a:extLst>
           </p:cNvPr>
@@ -11320,6 +11320,20 @@
               </a:spcAft>
             </a:pPr>
             <a:r>
+              <a:rPr lang="en-US" sz="1400" dirty="0" smtClean="0">
+                <a:solidFill>
+                  <a:schemeClr val="tx1">
+                    <a:lumMod val="60000"/>
+                    <a:lumOff val="40000"/>
+                  </a:schemeClr>
+                </a:solidFill>
+                <a:latin typeface="Source Sans Pro" charset="0"/>
+                <a:ea typeface="Source Sans Pro" charset="0"/>
+                <a:cs typeface="Source Sans Pro" charset="0"/>
+              </a:rPr>
+              <a:t>Example </a:t>
+            </a:r>
+            <a:r>
               <a:rPr lang="en-US" sz="1400" dirty="0">
                 <a:solidFill>
                   <a:schemeClr val="tx1">
@@ -11331,7 +11345,7 @@
                 <a:ea typeface="Source Sans Pro" charset="0"/>
                 <a:cs typeface="Source Sans Pro" charset="0"/>
               </a:rPr>
-              <a:t>Examples Applications</a:t>
+              <a:t>Applications</a:t>
             </a:r>
           </a:p>
         </p:txBody>
@@ -11341,7 +11355,7 @@
           <p:cNvPr id="51" name="Rounded Rectangle 36">
             <a:extLst>
               <a:ext uri="{FF2B5EF4-FFF2-40B4-BE49-F238E27FC236}">
-                <a16:creationId xmlns:a16="http://schemas.microsoft.com/office/drawing/2014/main" xmlns="" id="{283307E8-59C0-44A7-B2D4-03F3BD01F6ED}"/>
+                <a16:creationId xmlns="" xmlns:a16="http://schemas.microsoft.com/office/drawing/2014/main" id="{283307E8-59C0-44A7-B2D4-03F3BD01F6ED}"/>
               </a:ext>
             </a:extLst>
           </p:cNvPr>
@@ -11406,7 +11420,7 @@
           <p:cNvPr id="52" name="Rounded Rectangle 36">
             <a:extLst>
               <a:ext uri="{FF2B5EF4-FFF2-40B4-BE49-F238E27FC236}">
-                <a16:creationId xmlns:a16="http://schemas.microsoft.com/office/drawing/2014/main" xmlns="" id="{C8608BDC-F5B5-4939-8481-A80604A5D0D3}"/>
+                <a16:creationId xmlns="" xmlns:a16="http://schemas.microsoft.com/office/drawing/2014/main" id="{C8608BDC-F5B5-4939-8481-A80604A5D0D3}"/>
               </a:ext>
             </a:extLst>
           </p:cNvPr>
@@ -11471,7 +11485,7 @@
           <p:cNvPr id="53" name="Rounded Rectangle 32">
             <a:extLst>
               <a:ext uri="{FF2B5EF4-FFF2-40B4-BE49-F238E27FC236}">
-                <a16:creationId xmlns:a16="http://schemas.microsoft.com/office/drawing/2014/main" xmlns="" id="{DA840664-7456-4E94-B2C8-4B47ACB8B325}"/>
+                <a16:creationId xmlns="" xmlns:a16="http://schemas.microsoft.com/office/drawing/2014/main" id="{DA840664-7456-4E94-B2C8-4B47ACB8B325}"/>
               </a:ext>
             </a:extLst>
           </p:cNvPr>
@@ -11536,7 +11550,7 @@
           <p:cNvPr id="54" name="Rounded Rectangle 32">
             <a:extLst>
               <a:ext uri="{FF2B5EF4-FFF2-40B4-BE49-F238E27FC236}">
-                <a16:creationId xmlns:a16="http://schemas.microsoft.com/office/drawing/2014/main" xmlns="" id="{FB964F59-20F2-4C74-9159-946E02957282}"/>
+                <a16:creationId xmlns="" xmlns:a16="http://schemas.microsoft.com/office/drawing/2014/main" id="{FB964F59-20F2-4C74-9159-946E02957282}"/>
               </a:ext>
             </a:extLst>
           </p:cNvPr>
@@ -11601,7 +11615,7 @@
           <p:cNvPr id="55" name="Rounded Rectangle 32">
             <a:extLst>
               <a:ext uri="{FF2B5EF4-FFF2-40B4-BE49-F238E27FC236}">
-                <a16:creationId xmlns:a16="http://schemas.microsoft.com/office/drawing/2014/main" xmlns="" id="{4384512F-E95C-4D62-B4A9-A913BB7AC345}"/>
+                <a16:creationId xmlns="" xmlns:a16="http://schemas.microsoft.com/office/drawing/2014/main" id="{4384512F-E95C-4D62-B4A9-A913BB7AC345}"/>
               </a:ext>
             </a:extLst>
           </p:cNvPr>
@@ -11666,7 +11680,7 @@
           <p:cNvPr id="56" name="Rounded Rectangle 32">
             <a:extLst>
               <a:ext uri="{FF2B5EF4-FFF2-40B4-BE49-F238E27FC236}">
-                <a16:creationId xmlns:a16="http://schemas.microsoft.com/office/drawing/2014/main" xmlns="" id="{0CE1D744-F702-4CEA-B511-1160656204E1}"/>
+                <a16:creationId xmlns="" xmlns:a16="http://schemas.microsoft.com/office/drawing/2014/main" id="{0CE1D744-F702-4CEA-B511-1160656204E1}"/>
               </a:ext>
             </a:extLst>
           </p:cNvPr>
@@ -11731,7 +11745,7 @@
           <p:cNvPr id="58" name="Rounded Rectangle 41">
             <a:extLst>
               <a:ext uri="{FF2B5EF4-FFF2-40B4-BE49-F238E27FC236}">
-                <a16:creationId xmlns:a16="http://schemas.microsoft.com/office/drawing/2014/main" xmlns="" id="{B0719255-A67A-483A-BE33-9E1F0D087410}"/>
+                <a16:creationId xmlns="" xmlns:a16="http://schemas.microsoft.com/office/drawing/2014/main" id="{B0719255-A67A-483A-BE33-9E1F0D087410}"/>
               </a:ext>
             </a:extLst>
           </p:cNvPr>
@@ -11798,7 +11812,7 @@
           <p:cNvPr id="59" name="Rounded Rectangle 36">
             <a:extLst>
               <a:ext uri="{FF2B5EF4-FFF2-40B4-BE49-F238E27FC236}">
-                <a16:creationId xmlns:a16="http://schemas.microsoft.com/office/drawing/2014/main" xmlns="" id="{BD1E5A96-4D6B-4855-BC13-4A6D5BF7D99C}"/>
+                <a16:creationId xmlns="" xmlns:a16="http://schemas.microsoft.com/office/drawing/2014/main" id="{BD1E5A96-4D6B-4855-BC13-4A6D5BF7D99C}"/>
               </a:ext>
             </a:extLst>
           </p:cNvPr>
@@ -11863,7 +11877,7 @@
           <p:cNvPr id="60" name="Rounded Rectangle 32">
             <a:extLst>
               <a:ext uri="{FF2B5EF4-FFF2-40B4-BE49-F238E27FC236}">
-                <a16:creationId xmlns:a16="http://schemas.microsoft.com/office/drawing/2014/main" xmlns="" id="{5CCD933E-7C6F-48C2-8B16-5533A9756066}"/>
+                <a16:creationId xmlns="" xmlns:a16="http://schemas.microsoft.com/office/drawing/2014/main" id="{5CCD933E-7C6F-48C2-8B16-5533A9756066}"/>
               </a:ext>
             </a:extLst>
           </p:cNvPr>

</xml_diff>

<commit_message>
fix network overview LL layer.
</commit_message>
<xml_diff>
--- a/ApplicationDeveloperGuide/images/networking_overview.pptx
+++ b/ApplicationDeveloperGuide/images/networking_overview.pptx
@@ -15181,119 +15181,6 @@
       </p:sp>
       <p:sp>
         <p:nvSpPr>
-          <p:cNvPr id="82" name="Rounded Rectangle 73">
-            <a:extLst>
-              <a:ext uri="{FF2B5EF4-FFF2-40B4-BE49-F238E27FC236}">
-                <a16:creationId xmlns:a16="http://schemas.microsoft.com/office/drawing/2014/main" id="{D4EAF7F3-8A39-991D-641D-6311C585A8F8}"/>
-              </a:ext>
-            </a:extLst>
-          </p:cNvPr>
-          <p:cNvSpPr/>
-          <p:nvPr/>
-        </p:nvSpPr>
-        <p:spPr>
-          <a:xfrm>
-            <a:off x="5854998" y="4004472"/>
-            <a:ext cx="3391452" cy="288974"/>
-          </a:xfrm>
-          <a:prstGeom prst="roundRect">
-            <a:avLst>
-              <a:gd name="adj" fmla="val 13128"/>
-            </a:avLst>
-          </a:prstGeom>
-          <a:solidFill>
-            <a:schemeClr val="accent1"/>
-          </a:solidFill>
-          <a:ln w="12700">
-            <a:noFill/>
-          </a:ln>
-          <a:effectLst/>
-        </p:spPr>
-        <p:style>
-          <a:lnRef idx="2">
-            <a:schemeClr val="dk1"/>
-          </a:lnRef>
-          <a:fillRef idx="1">
-            <a:schemeClr val="lt1"/>
-          </a:fillRef>
-          <a:effectRef idx="0">
-            <a:schemeClr val="dk1"/>
-          </a:effectRef>
-          <a:fontRef idx="minor">
-            <a:schemeClr val="dk1"/>
-          </a:fontRef>
-        </p:style>
-        <p:txBody>
-          <a:bodyPr wrap="square" lIns="0" tIns="72000" rIns="0" bIns="36000" rtlCol="0" anchor="ctr">
-            <a:noAutofit/>
-          </a:bodyPr>
-          <a:lstStyle/>
-          <a:p>
-            <a:pPr algn="ctr">
-              <a:lnSpc>
-                <a:spcPts val="1000"/>
-              </a:lnSpc>
-            </a:pPr>
-            <a:r>
-              <a:rPr lang="en-US" sz="1200" dirty="0">
-                <a:solidFill>
-                  <a:schemeClr val="bg1"/>
-                </a:solidFill>
-                <a:latin typeface="Source Sans Pro Light" charset="0"/>
-                <a:ea typeface="Source Sans Pro Light" charset="0"/>
-                <a:cs typeface="Source Sans Pro Light" charset="0"/>
-              </a:rPr>
-              <a:t>Graphical Engine</a:t>
-            </a:r>
-          </a:p>
-        </p:txBody>
-      </p:sp>
-      <p:cxnSp>
-        <p:nvCxnSpPr>
-          <p:cNvPr id="83" name="Straight Connector 82">
-            <a:extLst>
-              <a:ext uri="{FF2B5EF4-FFF2-40B4-BE49-F238E27FC236}">
-                <a16:creationId xmlns:a16="http://schemas.microsoft.com/office/drawing/2014/main" id="{DFBBA7A3-D835-54A0-16FA-13A1196138FC}"/>
-              </a:ext>
-            </a:extLst>
-          </p:cNvPr>
-          <p:cNvCxnSpPr>
-            <a:cxnSpLocks/>
-          </p:cNvCxnSpPr>
-          <p:nvPr/>
-        </p:nvCxnSpPr>
-        <p:spPr>
-          <a:xfrm>
-            <a:off x="5882328" y="4405538"/>
-            <a:ext cx="3505569" cy="2209"/>
-          </a:xfrm>
-          <a:prstGeom prst="line">
-            <a:avLst/>
-          </a:prstGeom>
-          <a:ln w="38100" cap="rnd">
-            <a:solidFill>
-              <a:schemeClr val="accent1"/>
-            </a:solidFill>
-            <a:miter lim="800000"/>
-          </a:ln>
-        </p:spPr>
-        <p:style>
-          <a:lnRef idx="1">
-            <a:schemeClr val="accent1"/>
-          </a:lnRef>
-          <a:fillRef idx="0">
-            <a:schemeClr val="accent1"/>
-          </a:fillRef>
-          <a:effectRef idx="0">
-            <a:schemeClr val="accent1"/>
-          </a:effectRef>
-          <a:fontRef idx="minor">
-            <a:schemeClr val="tx1"/>
-          </a:fontRef>
-        </p:style>
-      </p:cxnSp>
-      <p:sp>
-        <p:nvSpPr>
           <p:cNvPr id="84" name="Rounded Rectangle 82">
             <a:extLst>
               <a:ext uri="{FF2B5EF4-FFF2-40B4-BE49-F238E27FC236}">
@@ -16021,77 +15908,6 @@
       </p:sp>
       <p:sp>
         <p:nvSpPr>
-          <p:cNvPr id="95" name="Rounded Rectangle 73">
-            <a:extLst>
-              <a:ext uri="{FF2B5EF4-FFF2-40B4-BE49-F238E27FC236}">
-                <a16:creationId xmlns:a16="http://schemas.microsoft.com/office/drawing/2014/main" id="{6D862180-79EC-A88A-0882-5CFF944DC781}"/>
-              </a:ext>
-            </a:extLst>
-          </p:cNvPr>
-          <p:cNvSpPr/>
-          <p:nvPr/>
-        </p:nvSpPr>
-        <p:spPr>
-          <a:xfrm>
-            <a:off x="5854998" y="4004472"/>
-            <a:ext cx="3550944" cy="288974"/>
-          </a:xfrm>
-          <a:prstGeom prst="roundRect">
-            <a:avLst>
-              <a:gd name="adj" fmla="val 13128"/>
-            </a:avLst>
-          </a:prstGeom>
-          <a:solidFill>
-            <a:schemeClr val="bg2">
-              <a:lumMod val="75000"/>
-            </a:schemeClr>
-          </a:solidFill>
-          <a:ln w="12700">
-            <a:noFill/>
-          </a:ln>
-          <a:effectLst/>
-        </p:spPr>
-        <p:style>
-          <a:lnRef idx="2">
-            <a:schemeClr val="dk1"/>
-          </a:lnRef>
-          <a:fillRef idx="1">
-            <a:schemeClr val="lt1"/>
-          </a:fillRef>
-          <a:effectRef idx="0">
-            <a:schemeClr val="dk1"/>
-          </a:effectRef>
-          <a:fontRef idx="minor">
-            <a:schemeClr val="dk1"/>
-          </a:fontRef>
-        </p:style>
-        <p:txBody>
-          <a:bodyPr wrap="square" lIns="0" tIns="72000" rIns="0" bIns="36000" rtlCol="0" anchor="ctr">
-            <a:noAutofit/>
-          </a:bodyPr>
-          <a:lstStyle/>
-          <a:p>
-            <a:pPr algn="ctr">
-              <a:lnSpc>
-                <a:spcPts val="1000"/>
-              </a:lnSpc>
-            </a:pPr>
-            <a:r>
-              <a:rPr lang="en-US" sz="1200" dirty="0">
-                <a:solidFill>
-                  <a:schemeClr val="bg1"/>
-                </a:solidFill>
-                <a:latin typeface="Source Sans Pro Light" charset="0"/>
-                <a:ea typeface="Source Sans Pro Light" charset="0"/>
-                <a:cs typeface="Source Sans Pro Light" charset="0"/>
-              </a:rPr>
-              <a:t>C stacks TCP/IP, TLS, Crypto, Bluetooth</a:t>
-            </a:r>
-          </a:p>
-        </p:txBody>
-      </p:sp>
-      <p:sp>
-        <p:nvSpPr>
           <p:cNvPr id="96" name="Rounded Rectangle 79">
             <a:extLst>
               <a:ext uri="{FF2B5EF4-FFF2-40B4-BE49-F238E27FC236}">
@@ -16939,82 +16755,6 @@
                 <a:cs typeface="Source Sans Pro Light" charset="0"/>
               </a:rPr>
               <a:t>ECOM-Wi-Fi</a:t>
-            </a:r>
-          </a:p>
-        </p:txBody>
-      </p:sp>
-      <p:sp>
-        <p:nvSpPr>
-          <p:cNvPr id="109" name="Rectangle 108">
-            <a:extLst>
-              <a:ext uri="{FF2B5EF4-FFF2-40B4-BE49-F238E27FC236}">
-                <a16:creationId xmlns:a16="http://schemas.microsoft.com/office/drawing/2014/main" id="{1B529FE1-6DDB-41F1-9BA3-2906273531E6}"/>
-              </a:ext>
-            </a:extLst>
-          </p:cNvPr>
-          <p:cNvSpPr/>
-          <p:nvPr/>
-        </p:nvSpPr>
-        <p:spPr>
-          <a:xfrm>
-            <a:off x="6710739" y="4352821"/>
-            <a:ext cx="1876846" cy="129587"/>
-          </a:xfrm>
-          <a:prstGeom prst="rect">
-            <a:avLst/>
-          </a:prstGeom>
-          <a:gradFill flip="none" rotWithShape="1">
-            <a:gsLst>
-              <a:gs pos="100000">
-                <a:srgbClr val="CBD3D7">
-                  <a:alpha val="0"/>
-                </a:srgbClr>
-              </a:gs>
-              <a:gs pos="0">
-                <a:schemeClr val="bg2">
-                  <a:alpha val="0"/>
-                </a:schemeClr>
-              </a:gs>
-              <a:gs pos="80000">
-                <a:srgbClr val="CBD3D7">
-                  <a:alpha val="90000"/>
-                </a:srgbClr>
-              </a:gs>
-              <a:gs pos="20000">
-                <a:schemeClr val="bg2">
-                  <a:alpha val="90000"/>
-                </a:schemeClr>
-              </a:gs>
-            </a:gsLst>
-            <a:lin ang="0" scaled="1"/>
-            <a:tileRect/>
-          </a:gradFill>
-          <a:ln w="31750">
-            <a:noFill/>
-          </a:ln>
-          <a:effectLst/>
-        </p:spPr>
-        <p:txBody>
-          <a:bodyPr wrap="square" lIns="0" tIns="0" rIns="0" bIns="0">
-            <a:spAutoFit/>
-          </a:bodyPr>
-          <a:lstStyle/>
-          <a:p>
-            <a:pPr algn="ctr">
-              <a:lnSpc>
-                <a:spcPts val="1000"/>
-              </a:lnSpc>
-            </a:pPr>
-            <a:r>
-              <a:rPr lang="en-US" sz="1000" b="1" dirty="0">
-                <a:ln w="0"/>
-                <a:solidFill>
-                  <a:schemeClr val="accent1"/>
-                </a:solidFill>
-                <a:latin typeface="Source Sans Pro" panose="020B0503030403020204" pitchFamily="34" charset="0"/>
-                <a:ea typeface="Source Sans Pro" panose="020B0503030403020204" pitchFamily="34" charset="0"/>
-              </a:rPr>
-              <a:t>ABSTRACTION LAYERS</a:t>
             </a:r>
           </a:p>
         </p:txBody>
@@ -17309,6 +17049,192 @@
               <a:ea typeface="Source Sans Pro" charset="0"/>
               <a:cs typeface="Source Sans Pro" charset="0"/>
             </a:endParaRPr>
+          </a:p>
+        </p:txBody>
+      </p:sp>
+      <p:cxnSp>
+        <p:nvCxnSpPr>
+          <p:cNvPr id="13" name="Straight Connector 12">
+            <a:extLst>
+              <a:ext uri="{FF2B5EF4-FFF2-40B4-BE49-F238E27FC236}">
+                <a16:creationId xmlns:a16="http://schemas.microsoft.com/office/drawing/2014/main" id="{D717A62E-C23D-D192-697B-59075CF561AB}"/>
+              </a:ext>
+            </a:extLst>
+          </p:cNvPr>
+          <p:cNvCxnSpPr>
+            <a:cxnSpLocks/>
+          </p:cNvCxnSpPr>
+          <p:nvPr/>
+        </p:nvCxnSpPr>
+        <p:spPr>
+          <a:xfrm>
+            <a:off x="5785060" y="4049718"/>
+            <a:ext cx="3584038" cy="0"/>
+          </a:xfrm>
+          <a:prstGeom prst="line">
+            <a:avLst/>
+          </a:prstGeom>
+          <a:ln w="38100" cap="rnd">
+            <a:solidFill>
+              <a:schemeClr val="accent1"/>
+            </a:solidFill>
+            <a:miter lim="800000"/>
+          </a:ln>
+        </p:spPr>
+        <p:style>
+          <a:lnRef idx="1">
+            <a:schemeClr val="accent1"/>
+          </a:lnRef>
+          <a:fillRef idx="0">
+            <a:schemeClr val="accent1"/>
+          </a:fillRef>
+          <a:effectRef idx="0">
+            <a:schemeClr val="accent1"/>
+          </a:effectRef>
+          <a:fontRef idx="minor">
+            <a:schemeClr val="tx1"/>
+          </a:fontRef>
+        </p:style>
+      </p:cxnSp>
+      <p:sp>
+        <p:nvSpPr>
+          <p:cNvPr id="15" name="Rounded Rectangle 27">
+            <a:extLst>
+              <a:ext uri="{FF2B5EF4-FFF2-40B4-BE49-F238E27FC236}">
+                <a16:creationId xmlns:a16="http://schemas.microsoft.com/office/drawing/2014/main" id="{AA10FA17-F234-9891-1873-4B3BCB594F2E}"/>
+              </a:ext>
+            </a:extLst>
+          </p:cNvPr>
+          <p:cNvSpPr/>
+          <p:nvPr/>
+        </p:nvSpPr>
+        <p:spPr>
+          <a:xfrm>
+            <a:off x="5757730" y="4154202"/>
+            <a:ext cx="3638641" cy="288974"/>
+          </a:xfrm>
+          <a:prstGeom prst="roundRect">
+            <a:avLst>
+              <a:gd name="adj" fmla="val 13128"/>
+            </a:avLst>
+          </a:prstGeom>
+          <a:solidFill>
+            <a:schemeClr val="bg2">
+              <a:lumMod val="75000"/>
+            </a:schemeClr>
+          </a:solidFill>
+          <a:ln w="12700">
+            <a:noFill/>
+          </a:ln>
+          <a:effectLst/>
+        </p:spPr>
+        <p:style>
+          <a:lnRef idx="2">
+            <a:schemeClr val="dk1"/>
+          </a:lnRef>
+          <a:fillRef idx="1">
+            <a:schemeClr val="lt1"/>
+          </a:fillRef>
+          <a:effectRef idx="0">
+            <a:schemeClr val="dk1"/>
+          </a:effectRef>
+          <a:fontRef idx="minor">
+            <a:schemeClr val="dk1"/>
+          </a:fontRef>
+        </p:style>
+        <p:txBody>
+          <a:bodyPr wrap="square" tIns="36000" bIns="36000" rtlCol="0" anchor="ctr">
+            <a:noAutofit/>
+          </a:bodyPr>
+          <a:lstStyle/>
+          <a:p>
+            <a:pPr algn="ctr"/>
+            <a:r>
+              <a:rPr lang="en-US" sz="1200" dirty="0">
+                <a:solidFill>
+                  <a:schemeClr val="bg1"/>
+                </a:solidFill>
+                <a:latin typeface="Source Sans Pro Light" charset="0"/>
+                <a:ea typeface="Source Sans Pro Light" charset="0"/>
+              </a:rPr>
+              <a:t>C stacks TCP/IP , TLS , Crypto, Bluetooth, GNSS</a:t>
+            </a:r>
+          </a:p>
+        </p:txBody>
+      </p:sp>
+      <p:sp>
+        <p:nvSpPr>
+          <p:cNvPr id="18" name="Rectangle 17">
+            <a:extLst>
+              <a:ext uri="{FF2B5EF4-FFF2-40B4-BE49-F238E27FC236}">
+                <a16:creationId xmlns:a16="http://schemas.microsoft.com/office/drawing/2014/main" id="{44B38841-2106-0496-1F3A-DDD73B01CF55}"/>
+              </a:ext>
+            </a:extLst>
+          </p:cNvPr>
+          <p:cNvSpPr/>
+          <p:nvPr/>
+        </p:nvSpPr>
+        <p:spPr>
+          <a:xfrm>
+            <a:off x="6602367" y="3999723"/>
+            <a:ext cx="1876846" cy="129587"/>
+          </a:xfrm>
+          <a:prstGeom prst="rect">
+            <a:avLst/>
+          </a:prstGeom>
+          <a:gradFill flip="none" rotWithShape="1">
+            <a:gsLst>
+              <a:gs pos="100000">
+                <a:srgbClr val="CBD3D7">
+                  <a:alpha val="0"/>
+                </a:srgbClr>
+              </a:gs>
+              <a:gs pos="0">
+                <a:schemeClr val="bg2">
+                  <a:alpha val="0"/>
+                </a:schemeClr>
+              </a:gs>
+              <a:gs pos="80000">
+                <a:srgbClr val="CBD3D7">
+                  <a:alpha val="90000"/>
+                </a:srgbClr>
+              </a:gs>
+              <a:gs pos="20000">
+                <a:schemeClr val="bg2">
+                  <a:alpha val="90000"/>
+                </a:schemeClr>
+              </a:gs>
+            </a:gsLst>
+            <a:lin ang="0" scaled="1"/>
+            <a:tileRect/>
+          </a:gradFill>
+          <a:ln w="31750">
+            <a:noFill/>
+          </a:ln>
+          <a:effectLst/>
+        </p:spPr>
+        <p:txBody>
+          <a:bodyPr wrap="square" lIns="0" tIns="0" rIns="0" bIns="0">
+            <a:spAutoFit/>
+          </a:bodyPr>
+          <a:lstStyle/>
+          <a:p>
+            <a:pPr algn="ctr">
+              <a:lnSpc>
+                <a:spcPts val="1000"/>
+              </a:lnSpc>
+            </a:pPr>
+            <a:r>
+              <a:rPr lang="en-US" sz="1000" b="1" dirty="0">
+                <a:ln w="0"/>
+                <a:solidFill>
+                  <a:schemeClr val="accent1"/>
+                </a:solidFill>
+                <a:latin typeface="Source Sans Pro" panose="020B0503030403020204" pitchFamily="34" charset="0"/>
+                <a:ea typeface="Source Sans Pro" panose="020B0503030403020204" pitchFamily="34" charset="0"/>
+              </a:rPr>
+              <a:t>ABSTRACTION LAYERS</a:t>
+            </a:r>
           </a:p>
         </p:txBody>
       </p:sp>

</xml_diff>

<commit_message>
update GNSS API/Pack to 2.0.0.
</commit_message>
<xml_diff>
--- a/ApplicationDeveloperGuide/images/networking_overview.pptx
+++ b/ApplicationDeveloperGuide/images/networking_overview.pptx
@@ -13710,7 +13710,7 @@
         </p:nvSpPr>
         <p:spPr>
           <a:xfrm>
-            <a:off x="4112004" y="3943443"/>
+            <a:off x="4114729" y="3941851"/>
             <a:ext cx="5225110" cy="1367846"/>
           </a:xfrm>
           <a:prstGeom prst="roundRect">
@@ -17110,8 +17110,8 @@
         </p:nvSpPr>
         <p:spPr>
           <a:xfrm>
-            <a:off x="5757730" y="4154202"/>
-            <a:ext cx="3638641" cy="288974"/>
+            <a:off x="5778330" y="4138505"/>
+            <a:ext cx="3618041" cy="288974"/>
           </a:xfrm>
           <a:prstGeom prst="roundRect">
             <a:avLst>

</xml_diff>